<commit_message>
Ignore slides: GIT e github.pptx
</commit_message>
<xml_diff>
--- a/GIT e github.pptx
+++ b/GIT e github.pptx
@@ -5,10 +5,10 @@
     <p:sldMasterId id="2147483673" r:id="rId1"/>
   </p:sldMasterIdLst>
   <p:notesMasterIdLst>
-    <p:notesMasterId r:id="rId8"/>
+    <p:notesMasterId r:id="rId10"/>
   </p:notesMasterIdLst>
   <p:handoutMasterIdLst>
-    <p:handoutMasterId r:id="rId9"/>
+    <p:handoutMasterId r:id="rId11"/>
   </p:handoutMasterIdLst>
   <p:sldIdLst>
     <p:sldId id="257" r:id="rId2"/>
@@ -17,6 +17,8 @@
     <p:sldId id="263" r:id="rId5"/>
     <p:sldId id="264" r:id="rId6"/>
     <p:sldId id="265" r:id="rId7"/>
+    <p:sldId id="266" r:id="rId8"/>
+    <p:sldId id="267" r:id="rId9"/>
   </p:sldIdLst>
   <p:sldSz cx="12192000" cy="6858000"/>
   <p:notesSz cx="6858000" cy="9144000"/>
@@ -131,7 +133,7 @@
   <pc:docChgLst>
     <pc:chgData name="Elvir Moraes" userId="6d2f8f00182966cc" providerId="LiveId" clId="{754F238D-618E-4FD5-9BE3-FFF1957A5457}"/>
     <pc:docChg chg="custSel addSld modSld">
-      <pc:chgData name="Elvir Moraes" userId="6d2f8f00182966cc" providerId="LiveId" clId="{754F238D-618E-4FD5-9BE3-FFF1957A5457}" dt="2023-04-30T00:10:26.556" v="28" actId="14100"/>
+      <pc:chgData name="Elvir Moraes" userId="6d2f8f00182966cc" providerId="LiveId" clId="{754F238D-618E-4FD5-9BE3-FFF1957A5457}" dt="2023-05-01T17:52:46.802" v="37" actId="478"/>
       <pc:docMkLst>
         <pc:docMk/>
       </pc:docMkLst>
@@ -258,6 +260,60 @@
             <ac:picMk id="6" creationId="{BF45632D-F4E0-FF8B-852A-466D6E0029A8}"/>
           </ac:picMkLst>
         </pc:picChg>
+      </pc:sldChg>
+      <pc:sldChg chg="addSp delSp modSp new mod">
+        <pc:chgData name="Elvir Moraes" userId="6d2f8f00182966cc" providerId="LiveId" clId="{754F238D-618E-4FD5-9BE3-FFF1957A5457}" dt="2023-05-01T17:52:33.853" v="34" actId="14100"/>
+        <pc:sldMkLst>
+          <pc:docMk/>
+          <pc:sldMk cId="703892564" sldId="266"/>
+        </pc:sldMkLst>
+        <pc:spChg chg="del">
+          <ac:chgData name="Elvir Moraes" userId="6d2f8f00182966cc" providerId="LiveId" clId="{754F238D-618E-4FD5-9BE3-FFF1957A5457}" dt="2023-05-01T17:52:19.090" v="30" actId="478"/>
+          <ac:spMkLst>
+            <pc:docMk/>
+            <pc:sldMk cId="703892564" sldId="266"/>
+            <ac:spMk id="2" creationId="{1F5D70E9-73C7-D42B-9300-5C6C4069B06F}"/>
+          </ac:spMkLst>
+        </pc:spChg>
+        <pc:spChg chg="del">
+          <ac:chgData name="Elvir Moraes" userId="6d2f8f00182966cc" providerId="LiveId" clId="{754F238D-618E-4FD5-9BE3-FFF1957A5457}" dt="2023-05-01T17:52:23.264" v="31" actId="478"/>
+          <ac:spMkLst>
+            <pc:docMk/>
+            <pc:sldMk cId="703892564" sldId="266"/>
+            <ac:spMk id="3" creationId="{356A3048-13CD-15E7-B1B0-3C7CDC621357}"/>
+          </ac:spMkLst>
+        </pc:spChg>
+        <pc:picChg chg="add mod">
+          <ac:chgData name="Elvir Moraes" userId="6d2f8f00182966cc" providerId="LiveId" clId="{754F238D-618E-4FD5-9BE3-FFF1957A5457}" dt="2023-05-01T17:52:33.853" v="34" actId="14100"/>
+          <ac:picMkLst>
+            <pc:docMk/>
+            <pc:sldMk cId="703892564" sldId="266"/>
+            <ac:picMk id="6" creationId="{DA50090F-DB0D-11CA-70DA-ED88D3514DC3}"/>
+          </ac:picMkLst>
+        </pc:picChg>
+      </pc:sldChg>
+      <pc:sldChg chg="delSp new mod">
+        <pc:chgData name="Elvir Moraes" userId="6d2f8f00182966cc" providerId="LiveId" clId="{754F238D-618E-4FD5-9BE3-FFF1957A5457}" dt="2023-05-01T17:52:46.802" v="37" actId="478"/>
+        <pc:sldMkLst>
+          <pc:docMk/>
+          <pc:sldMk cId="3682747720" sldId="267"/>
+        </pc:sldMkLst>
+        <pc:spChg chg="del">
+          <ac:chgData name="Elvir Moraes" userId="6d2f8f00182966cc" providerId="LiveId" clId="{754F238D-618E-4FD5-9BE3-FFF1957A5457}" dt="2023-05-01T17:52:43.526" v="36" actId="478"/>
+          <ac:spMkLst>
+            <pc:docMk/>
+            <pc:sldMk cId="3682747720" sldId="267"/>
+            <ac:spMk id="2" creationId="{8D7561A9-F80D-E3D8-2369-2267086790C4}"/>
+          </ac:spMkLst>
+        </pc:spChg>
+        <pc:spChg chg="del">
+          <ac:chgData name="Elvir Moraes" userId="6d2f8f00182966cc" providerId="LiveId" clId="{754F238D-618E-4FD5-9BE3-FFF1957A5457}" dt="2023-05-01T17:52:46.802" v="37" actId="478"/>
+          <ac:spMkLst>
+            <pc:docMk/>
+            <pc:sldMk cId="3682747720" sldId="267"/>
+            <ac:spMk id="3" creationId="{958BA250-0EA6-34E3-538C-6B4DC640C3BB}"/>
+          </ac:spMkLst>
+        </pc:spChg>
       </pc:sldChg>
     </pc:docChg>
   </pc:docChgLst>
@@ -3331,7 +3387,7 @@
             <a:pPr rtl="0"/>
             <a:fld id="{4A170B22-A4BB-4708-B0CE-A73E8306129B}" type="datetime1">
               <a:rPr lang="pt-BR" smtClean="0"/>
-              <a:t>29/04/2023</a:t>
+              <a:t>01/05/2023</a:t>
             </a:fld>
             <a:endParaRPr lang="en-US" dirty="0"/>
           </a:p>
@@ -3501,7 +3557,7 @@
             <a:pPr rtl="0"/>
             <a:fld id="{E6245E56-2EE9-450B-A671-BE5C90BAC91C}" type="datetime1">
               <a:rPr lang="pt-BR" smtClean="0"/>
-              <a:t>29/04/2023</a:t>
+              <a:t>01/05/2023</a:t>
             </a:fld>
             <a:endParaRPr lang="en-US"/>
           </a:p>
@@ -4246,7 +4302,7 @@
             <a:pPr rtl="0"/>
             <a:fld id="{2F3AF6F7-5911-45C3-BE0F-7F38FEFE43FA}" type="datetime1">
               <a:rPr lang="pt-BR" smtClean="0"/>
-              <a:t>29/04/2023</a:t>
+              <a:t>01/05/2023</a:t>
             </a:fld>
             <a:endParaRPr lang="en-US" dirty="0"/>
           </a:p>
@@ -4458,7 +4514,7 @@
             <a:pPr rtl="0"/>
             <a:fld id="{870C3F0E-1EAD-419A-B8F3-CB7CDE6B1E86}" type="datetime1">
               <a:rPr lang="pt-BR" smtClean="0"/>
-              <a:t>29/04/2023</a:t>
+              <a:t>01/05/2023</a:t>
             </a:fld>
             <a:endParaRPr lang="en-US"/>
           </a:p>
@@ -4646,7 +4702,7 @@
             <a:pPr rtl="0"/>
             <a:fld id="{5274CCBA-3812-426F-BA8C-8BC3E97D7FB5}" type="datetime1">
               <a:rPr lang="pt-BR" smtClean="0"/>
-              <a:t>29/04/2023</a:t>
+              <a:t>01/05/2023</a:t>
             </a:fld>
             <a:endParaRPr lang="en-US"/>
           </a:p>
@@ -4826,7 +4882,7 @@
             <a:pPr rtl="0"/>
             <a:fld id="{D48C737E-092E-4203-A347-8410086932C6}" type="datetime1">
               <a:rPr lang="pt-BR" smtClean="0"/>
-              <a:t>29/04/2023</a:t>
+              <a:t>01/05/2023</a:t>
             </a:fld>
             <a:endParaRPr lang="en-US"/>
           </a:p>
@@ -5429,7 +5485,7 @@
             <a:pPr rtl="0"/>
             <a:fld id="{494319B4-ED34-4D08-91C0-F7E8BD9417E6}" type="datetime1">
               <a:rPr lang="pt-BR" smtClean="0"/>
-              <a:t>29/04/2023</a:t>
+              <a:t>01/05/2023</a:t>
             </a:fld>
             <a:endParaRPr lang="en-US" dirty="0"/>
           </a:p>
@@ -5753,7 +5809,7 @@
             <a:pPr rtl="0"/>
             <a:fld id="{EDD1C28D-3F4C-4305-9CD5-9949626E9ED5}" type="datetime1">
               <a:rPr lang="pt-BR" smtClean="0"/>
-              <a:t>29/04/2023</a:t>
+              <a:t>01/05/2023</a:t>
             </a:fld>
             <a:endParaRPr lang="en-US"/>
           </a:p>
@@ -6200,7 +6256,7 @@
             <a:pPr rtl="0"/>
             <a:fld id="{D05F8630-DFFC-437C-A718-61BE3F548C4E}" type="datetime1">
               <a:rPr lang="pt-BR" smtClean="0"/>
-              <a:t>29/04/2023</a:t>
+              <a:t>01/05/2023</a:t>
             </a:fld>
             <a:endParaRPr lang="en-US"/>
           </a:p>
@@ -6328,7 +6384,7 @@
             <a:pPr rtl="0"/>
             <a:fld id="{3812AD8E-909B-47FE-B3D6-961E1D2E7A49}" type="datetime1">
               <a:rPr lang="pt-BR" smtClean="0"/>
-              <a:t>29/04/2023</a:t>
+              <a:t>01/05/2023</a:t>
             </a:fld>
             <a:endParaRPr lang="en-US"/>
           </a:p>
@@ -6426,7 +6482,7 @@
             <a:pPr rtl="0"/>
             <a:fld id="{5D0BF672-AFC3-4C39-AA84-C1113D4307F1}" type="datetime1">
               <a:rPr lang="pt-BR" smtClean="0"/>
-              <a:t>29/04/2023</a:t>
+              <a:t>01/05/2023</a:t>
             </a:fld>
             <a:endParaRPr lang="en-US"/>
           </a:p>
@@ -6847,7 +6903,7 @@
             <a:pPr rtl="0"/>
             <a:fld id="{B01F5550-97CC-4F3B-A34B-FE39BFD06EF0}" type="datetime1">
               <a:rPr lang="pt-BR" smtClean="0"/>
-              <a:t>29/04/2023</a:t>
+              <a:t>01/05/2023</a:t>
             </a:fld>
             <a:endParaRPr lang="en-US"/>
           </a:p>
@@ -7112,7 +7168,7 @@
             <a:pPr rtl="0"/>
             <a:fld id="{7975B8C2-382E-4F5E-B0CE-7E0EEF75E017}" type="datetime1">
               <a:rPr lang="pt-BR" smtClean="0"/>
-              <a:t>29/04/2023</a:t>
+              <a:t>01/05/2023</a:t>
             </a:fld>
             <a:endParaRPr lang="en-US" dirty="0"/>
           </a:p>
@@ -7632,7 +7688,7 @@
             <a:pPr rtl="0"/>
             <a:fld id="{91DF2A3A-30FD-464E-8202-27A276433376}" type="datetime1">
               <a:rPr lang="pt-BR" smtClean="0"/>
-              <a:t>29/04/2023</a:t>
+              <a:t>01/05/2023</a:t>
             </a:fld>
             <a:endParaRPr lang="en-US" dirty="0"/>
           </a:p>
@@ -8499,7 +8555,7 @@
             <a:pPr rtl="0"/>
             <a:fld id="{D48C737E-092E-4203-A347-8410086932C6}" type="datetime1">
               <a:rPr lang="pt-BR" smtClean="0"/>
-              <a:t>29/04/2023</a:t>
+              <a:t>01/05/2023</a:t>
             </a:fld>
             <a:endParaRPr lang="en-US"/>
           </a:p>
@@ -8589,7 +8645,7 @@
             <a:pPr rtl="0"/>
             <a:fld id="{D48C737E-092E-4203-A347-8410086932C6}" type="datetime1">
               <a:rPr lang="pt-BR" smtClean="0"/>
-              <a:t>29/04/2023</a:t>
+              <a:t>01/05/2023</a:t>
             </a:fld>
             <a:endParaRPr lang="en-US"/>
           </a:p>
@@ -8679,7 +8735,7 @@
             <a:pPr rtl="0"/>
             <a:fld id="{D48C737E-092E-4203-A347-8410086932C6}" type="datetime1">
               <a:rPr lang="pt-BR" smtClean="0"/>
-              <a:t>29/04/2023</a:t>
+              <a:t>01/05/2023</a:t>
             </a:fld>
             <a:endParaRPr lang="en-US"/>
           </a:p>
@@ -8769,7 +8825,7 @@
             <a:pPr rtl="0"/>
             <a:fld id="{D48C737E-092E-4203-A347-8410086932C6}" type="datetime1">
               <a:rPr lang="pt-BR" smtClean="0"/>
-              <a:t>29/04/2023</a:t>
+              <a:t>01/05/2023</a:t>
             </a:fld>
             <a:endParaRPr lang="en-US"/>
           </a:p>
@@ -8809,6 +8865,156 @@
     <p:extLst>
       <p:ext uri="{BB962C8B-B14F-4D97-AF65-F5344CB8AC3E}">
         <p14:creationId xmlns:p14="http://schemas.microsoft.com/office/powerpoint/2010/main" val="1464600356"/>
+      </p:ext>
+    </p:extLst>
+  </p:cSld>
+  <p:clrMapOvr>
+    <a:masterClrMapping/>
+  </p:clrMapOvr>
+</p:sld>
+</file>
+
+<file path=ppt/slides/slide7.xml><?xml version="1.0" encoding="utf-8"?>
+<p:sld xmlns:a="http://schemas.openxmlformats.org/drawingml/2006/main" xmlns:r="http://schemas.openxmlformats.org/officeDocument/2006/relationships" xmlns:p="http://schemas.openxmlformats.org/presentationml/2006/main">
+  <p:cSld>
+    <p:spTree>
+      <p:nvGrpSpPr>
+        <p:cNvPr id="1" name=""/>
+        <p:cNvGrpSpPr/>
+        <p:nvPr/>
+      </p:nvGrpSpPr>
+      <p:grpSpPr>
+        <a:xfrm>
+          <a:off x="0" y="0"/>
+          <a:ext cx="0" cy="0"/>
+          <a:chOff x="0" y="0"/>
+          <a:chExt cx="0" cy="0"/>
+        </a:xfrm>
+      </p:grpSpPr>
+      <p:sp>
+        <p:nvSpPr>
+          <p:cNvPr id="4" name="Espaço Reservado para Data 3">
+            <a:extLst>
+              <a:ext uri="{FF2B5EF4-FFF2-40B4-BE49-F238E27FC236}">
+                <a16:creationId xmlns:a16="http://schemas.microsoft.com/office/drawing/2014/main" id="{EA72D5B0-F44A-D16C-8EF8-7B29D05F7F2E}"/>
+              </a:ext>
+            </a:extLst>
+          </p:cNvPr>
+          <p:cNvSpPr>
+            <a:spLocks noGrp="1"/>
+          </p:cNvSpPr>
+          <p:nvPr>
+            <p:ph type="dt" sz="half" idx="10"/>
+          </p:nvPr>
+        </p:nvSpPr>
+        <p:spPr/>
+        <p:txBody>
+          <a:bodyPr/>
+          <a:lstStyle/>
+          <a:p>
+            <a:pPr rtl="0"/>
+            <a:fld id="{D48C737E-092E-4203-A347-8410086932C6}" type="datetime1">
+              <a:rPr lang="pt-BR" smtClean="0"/>
+              <a:t>01/05/2023</a:t>
+            </a:fld>
+            <a:endParaRPr lang="en-US"/>
+          </a:p>
+        </p:txBody>
+      </p:sp>
+      <p:pic>
+        <p:nvPicPr>
+          <p:cNvPr id="6" name="Imagem 5">
+            <a:extLst>
+              <a:ext uri="{FF2B5EF4-FFF2-40B4-BE49-F238E27FC236}">
+                <a16:creationId xmlns:a16="http://schemas.microsoft.com/office/drawing/2014/main" id="{DA50090F-DB0D-11CA-70DA-ED88D3514DC3}"/>
+              </a:ext>
+            </a:extLst>
+          </p:cNvPr>
+          <p:cNvPicPr>
+            <a:picLocks noChangeAspect="1"/>
+          </p:cNvPicPr>
+          <p:nvPr/>
+        </p:nvPicPr>
+        <p:blipFill>
+          <a:blip r:embed="rId2"/>
+          <a:stretch>
+            <a:fillRect/>
+          </a:stretch>
+        </p:blipFill>
+        <p:spPr>
+          <a:xfrm>
+            <a:off x="429333" y="457200"/>
+            <a:ext cx="11333333" cy="5943600"/>
+          </a:xfrm>
+          <a:prstGeom prst="rect">
+            <a:avLst/>
+          </a:prstGeom>
+        </p:spPr>
+      </p:pic>
+    </p:spTree>
+    <p:extLst>
+      <p:ext uri="{BB962C8B-B14F-4D97-AF65-F5344CB8AC3E}">
+        <p14:creationId xmlns:p14="http://schemas.microsoft.com/office/powerpoint/2010/main" val="703892564"/>
+      </p:ext>
+    </p:extLst>
+  </p:cSld>
+  <p:clrMapOvr>
+    <a:masterClrMapping/>
+  </p:clrMapOvr>
+</p:sld>
+</file>
+
+<file path=ppt/slides/slide8.xml><?xml version="1.0" encoding="utf-8"?>
+<p:sld xmlns:a="http://schemas.openxmlformats.org/drawingml/2006/main" xmlns:r="http://schemas.openxmlformats.org/officeDocument/2006/relationships" xmlns:p="http://schemas.openxmlformats.org/presentationml/2006/main">
+  <p:cSld>
+    <p:spTree>
+      <p:nvGrpSpPr>
+        <p:cNvPr id="1" name=""/>
+        <p:cNvGrpSpPr/>
+        <p:nvPr/>
+      </p:nvGrpSpPr>
+      <p:grpSpPr>
+        <a:xfrm>
+          <a:off x="0" y="0"/>
+          <a:ext cx="0" cy="0"/>
+          <a:chOff x="0" y="0"/>
+          <a:chExt cx="0" cy="0"/>
+        </a:xfrm>
+      </p:grpSpPr>
+      <p:sp>
+        <p:nvSpPr>
+          <p:cNvPr id="4" name="Espaço Reservado para Data 3">
+            <a:extLst>
+              <a:ext uri="{FF2B5EF4-FFF2-40B4-BE49-F238E27FC236}">
+                <a16:creationId xmlns:a16="http://schemas.microsoft.com/office/drawing/2014/main" id="{5FA782B0-B98F-A18B-7835-6BF928374E24}"/>
+              </a:ext>
+            </a:extLst>
+          </p:cNvPr>
+          <p:cNvSpPr>
+            <a:spLocks noGrp="1"/>
+          </p:cNvSpPr>
+          <p:nvPr>
+            <p:ph type="dt" sz="half" idx="10"/>
+          </p:nvPr>
+        </p:nvSpPr>
+        <p:spPr/>
+        <p:txBody>
+          <a:bodyPr/>
+          <a:lstStyle/>
+          <a:p>
+            <a:pPr rtl="0"/>
+            <a:fld id="{D48C737E-092E-4203-A347-8410086932C6}" type="datetime1">
+              <a:rPr lang="pt-BR" smtClean="0"/>
+              <a:t>01/05/2023</a:t>
+            </a:fld>
+            <a:endParaRPr lang="en-US"/>
+          </a:p>
+        </p:txBody>
+      </p:sp>
+    </p:spTree>
+    <p:extLst>
+      <p:ext uri="{BB962C8B-B14F-4D97-AF65-F5344CB8AC3E}">
+        <p14:creationId xmlns:p14="http://schemas.microsoft.com/office/powerpoint/2010/main" val="3682747720"/>
       </p:ext>
     </p:extLst>
   </p:cSld>

</xml_diff>